<commit_message>
Updated PPTX - centralized logos
</commit_message>
<xml_diff>
--- a/slides/VirtualConfWithAzure.pptx
+++ b/slides/VirtualConfWithAzure.pptx
@@ -11,7 +11,7 @@
     <p:sldMasterId id="2147483758" r:id="rId7"/>
   </p:sldMasterIdLst>
   <p:notesMasterIdLst>
-    <p:notesMasterId r:id="rId32"/>
+    <p:notesMasterId r:id="rId33"/>
   </p:notesMasterIdLst>
   <p:sldIdLst>
     <p:sldId id="257" r:id="rId8"/>
@@ -22,22 +22,23 @@
     <p:sldId id="271" r:id="rId13"/>
     <p:sldId id="272" r:id="rId14"/>
     <p:sldId id="256" r:id="rId15"/>
-    <p:sldId id="265" r:id="rId16"/>
-    <p:sldId id="289" r:id="rId17"/>
-    <p:sldId id="274" r:id="rId18"/>
-    <p:sldId id="275" r:id="rId19"/>
-    <p:sldId id="276" r:id="rId20"/>
-    <p:sldId id="277" r:id="rId21"/>
-    <p:sldId id="290" r:id="rId22"/>
-    <p:sldId id="278" r:id="rId23"/>
-    <p:sldId id="282" r:id="rId24"/>
-    <p:sldId id="283" r:id="rId25"/>
-    <p:sldId id="284" r:id="rId26"/>
-    <p:sldId id="286" r:id="rId27"/>
-    <p:sldId id="285" r:id="rId28"/>
-    <p:sldId id="287" r:id="rId29"/>
-    <p:sldId id="291" r:id="rId30"/>
-    <p:sldId id="263" r:id="rId31"/>
+    <p:sldId id="292" r:id="rId16"/>
+    <p:sldId id="265" r:id="rId17"/>
+    <p:sldId id="289" r:id="rId18"/>
+    <p:sldId id="274" r:id="rId19"/>
+    <p:sldId id="275" r:id="rId20"/>
+    <p:sldId id="276" r:id="rId21"/>
+    <p:sldId id="277" r:id="rId22"/>
+    <p:sldId id="290" r:id="rId23"/>
+    <p:sldId id="278" r:id="rId24"/>
+    <p:sldId id="282" r:id="rId25"/>
+    <p:sldId id="283" r:id="rId26"/>
+    <p:sldId id="284" r:id="rId27"/>
+    <p:sldId id="286" r:id="rId28"/>
+    <p:sldId id="285" r:id="rId29"/>
+    <p:sldId id="287" r:id="rId30"/>
+    <p:sldId id="291" r:id="rId31"/>
+    <p:sldId id="263" r:id="rId32"/>
   </p:sldIdLst>
   <p:sldSz cx="12192000" cy="6858000"/>
   <p:notesSz cx="6858000" cy="9144000"/>
@@ -226,7 +227,7 @@
           <a:p>
             <a:fld id="{0E990FE3-7537-4D15-A9F5-FDF1805FD5F8}" type="datetimeFigureOut">
               <a:rPr lang="en-US" smtClean="0"/>
-              <a:t>9/14/2014</a:t>
+              <a:t>9/15/2014</a:t>
             </a:fld>
             <a:endParaRPr lang="en-US"/>
           </a:p>
@@ -970,7 +971,7 @@
           <a:p>
             <a:fld id="{50A28030-5D59-4E14-AFE9-B93D391AF3AF}" type="datetime1">
               <a:rPr lang="en-US" smtClean="0"/>
-              <a:t>9/14/2014</a:t>
+              <a:t>9/15/2014</a:t>
             </a:fld>
             <a:endParaRPr lang="en-US" dirty="0"/>
           </a:p>
@@ -994,7 +995,7 @@
             <a:fld id="{B4008EB6-D09E-4580-8CD6-DDB14511944F}" type="slidenum">
               <a:rPr lang="en-US" smtClean="0"/>
               <a:pPr/>
-              <a:t>10</a:t>
+              <a:t>11</a:t>
             </a:fld>
             <a:endParaRPr lang="en-US" dirty="0"/>
           </a:p>
@@ -1489,7 +1490,7 @@
           <a:p>
             <a:fld id="{50A28030-5D59-4E14-AFE9-B93D391AF3AF}" type="datetime1">
               <a:rPr lang="en-US" smtClean="0"/>
-              <a:t>9/14/2014</a:t>
+              <a:t>9/15/2014</a:t>
             </a:fld>
             <a:endParaRPr lang="en-US" dirty="0"/>
           </a:p>
@@ -1513,7 +1514,7 @@
             <a:fld id="{B4008EB6-D09E-4580-8CD6-DDB14511944F}" type="slidenum">
               <a:rPr lang="en-US" smtClean="0"/>
               <a:pPr/>
-              <a:t>13</a:t>
+              <a:t>14</a:t>
             </a:fld>
             <a:endParaRPr lang="en-US" dirty="0"/>
           </a:p>
@@ -2008,7 +2009,7 @@
           <a:p>
             <a:fld id="{50A28030-5D59-4E14-AFE9-B93D391AF3AF}" type="datetime1">
               <a:rPr lang="en-US" smtClean="0"/>
-              <a:t>9/14/2014</a:t>
+              <a:t>9/15/2014</a:t>
             </a:fld>
             <a:endParaRPr lang="en-US" dirty="0"/>
           </a:p>
@@ -2032,7 +2033,7 @@
             <a:fld id="{B4008EB6-D09E-4580-8CD6-DDB14511944F}" type="slidenum">
               <a:rPr lang="en-US" smtClean="0"/>
               <a:pPr/>
-              <a:t>15</a:t>
+              <a:t>16</a:t>
             </a:fld>
             <a:endParaRPr lang="en-US" dirty="0"/>
           </a:p>
@@ -19285,6 +19286,164 @@
 </file>
 
 <file path=ppt/slides/slide10.xml><?xml version="1.0" encoding="utf-8"?>
+<p:sld xmlns:a="http://schemas.openxmlformats.org/drawingml/2006/main" xmlns:r="http://schemas.openxmlformats.org/officeDocument/2006/relationships" xmlns:p="http://schemas.openxmlformats.org/presentationml/2006/main">
+  <p:cSld>
+    <p:spTree>
+      <p:nvGrpSpPr>
+        <p:cNvPr id="1" name=""/>
+        <p:cNvGrpSpPr/>
+        <p:nvPr/>
+      </p:nvGrpSpPr>
+      <p:grpSpPr>
+        <a:xfrm>
+          <a:off x="0" y="0"/>
+          <a:ext cx="0" cy="0"/>
+          <a:chOff x="0" y="0"/>
+          <a:chExt cx="0" cy="0"/>
+        </a:xfrm>
+      </p:grpSpPr>
+      <p:sp>
+        <p:nvSpPr>
+          <p:cNvPr id="2" name="Title 1"/>
+          <p:cNvSpPr>
+            <a:spLocks noGrp="1"/>
+          </p:cNvSpPr>
+          <p:nvPr>
+            <p:ph type="ctrTitle"/>
+          </p:nvPr>
+        </p:nvSpPr>
+        <p:spPr>
+          <a:xfrm>
+            <a:off x="606175" y="676048"/>
+            <a:ext cx="11034445" cy="2387600"/>
+          </a:xfrm>
+        </p:spPr>
+        <p:txBody>
+          <a:bodyPr/>
+          <a:lstStyle/>
+          <a:p>
+            <a:r>
+              <a:rPr lang="en-US" dirty="0" err="1" smtClean="0"/>
+              <a:t>mvcConf</a:t>
+            </a:r>
+            <a:r>
+              <a:rPr lang="en-US" dirty="0" smtClean="0"/>
+              <a:t> 1 &amp; 2</a:t>
+            </a:r>
+            <a:endParaRPr lang="en-US" dirty="0"/>
+          </a:p>
+        </p:txBody>
+      </p:sp>
+      <p:sp>
+        <p:nvSpPr>
+          <p:cNvPr id="3" name="Subtitle 2"/>
+          <p:cNvSpPr>
+            <a:spLocks noGrp="1"/>
+          </p:cNvSpPr>
+          <p:nvPr>
+            <p:ph type="subTitle" idx="1"/>
+          </p:nvPr>
+        </p:nvSpPr>
+        <p:spPr>
+          <a:xfrm>
+            <a:off x="606175" y="3210153"/>
+            <a:ext cx="11034445" cy="1655762"/>
+          </a:xfrm>
+        </p:spPr>
+        <p:txBody>
+          <a:bodyPr>
+            <a:noAutofit/>
+          </a:bodyPr>
+          <a:lstStyle/>
+          <a:p>
+            <a:pPr>
+              <a:lnSpc>
+                <a:spcPct val="110000"/>
+              </a:lnSpc>
+            </a:pPr>
+            <a:r>
+              <a:rPr lang="en-US" dirty="0" smtClean="0">
+                <a:sym typeface="Wingdings" panose="05000000000000000000" pitchFamily="2" charset="2"/>
+              </a:rPr>
+              <a:t> Single shared host</a:t>
+            </a:r>
+            <a:endParaRPr lang="en-US" dirty="0" smtClean="0"/>
+          </a:p>
+          <a:p>
+            <a:pPr>
+              <a:lnSpc>
+                <a:spcPct val="110000"/>
+              </a:lnSpc>
+            </a:pPr>
+            <a:r>
+              <a:rPr lang="en-US" dirty="0" smtClean="0">
+                <a:sym typeface="Wingdings" panose="05000000000000000000" pitchFamily="2" charset="2"/>
+              </a:rPr>
+              <a:t> Unforeseen capacity </a:t>
+            </a:r>
+            <a:r>
+              <a:rPr lang="en-US" dirty="0">
+                <a:sym typeface="Wingdings" panose="05000000000000000000" pitchFamily="2" charset="2"/>
+              </a:rPr>
+              <a:t>i</a:t>
+            </a:r>
+            <a:r>
+              <a:rPr lang="en-US" dirty="0" smtClean="0">
+                <a:sym typeface="Wingdings" panose="05000000000000000000" pitchFamily="2" charset="2"/>
+              </a:rPr>
+              <a:t>ssues (Good Problem)</a:t>
+            </a:r>
+            <a:endParaRPr lang="en-US" dirty="0" smtClean="0"/>
+          </a:p>
+          <a:p>
+            <a:pPr>
+              <a:lnSpc>
+                <a:spcPct val="110000"/>
+              </a:lnSpc>
+            </a:pPr>
+            <a:r>
+              <a:rPr lang="en-US" dirty="0" smtClean="0">
+                <a:sym typeface="Wingdings" panose="05000000000000000000" pitchFamily="2" charset="2"/>
+              </a:rPr>
+              <a:t> Better </a:t>
+            </a:r>
+            <a:r>
+              <a:rPr lang="en-US" dirty="0">
+                <a:sym typeface="Wingdings" panose="05000000000000000000" pitchFamily="2" charset="2"/>
+              </a:rPr>
+              <a:t>d</a:t>
+            </a:r>
+            <a:r>
+              <a:rPr lang="en-US" dirty="0" smtClean="0">
+                <a:sym typeface="Wingdings" panose="05000000000000000000" pitchFamily="2" charset="2"/>
+              </a:rPr>
+              <a:t>eployment story</a:t>
+            </a:r>
+            <a:endParaRPr lang="en-US" dirty="0"/>
+          </a:p>
+        </p:txBody>
+      </p:sp>
+    </p:spTree>
+    <p:extLst>
+      <p:ext uri="{BB962C8B-B14F-4D97-AF65-F5344CB8AC3E}">
+        <p14:creationId xmlns:p14="http://schemas.microsoft.com/office/powerpoint/2010/main" val="3144684332"/>
+      </p:ext>
+    </p:extLst>
+  </p:cSld>
+  <p:clrMapOvr>
+    <a:masterClrMapping/>
+  </p:clrMapOvr>
+  <p:timing>
+    <p:tnLst>
+      <p:par>
+        <p:cTn id="1" dur="indefinite" restart="never" nodeType="tmRoot"/>
+      </p:par>
+    </p:tnLst>
+  </p:timing>
+</p:sld>
+</file>
+
+<file path=ppt/slides/slide11.xml><?xml version="1.0" encoding="utf-8"?>
 <p:sld xmlns:a="http://schemas.openxmlformats.org/drawingml/2006/main" xmlns:r="http://schemas.openxmlformats.org/officeDocument/2006/relationships" xmlns:p="http://schemas.openxmlformats.org/presentationml/2006/main">
   <p:cSld>
     <p:spTree>
@@ -20694,136 +20853,6 @@
 </p:sld>
 </file>
 
-<file path=ppt/slides/slide11.xml><?xml version="1.0" encoding="utf-8"?>
-<p:sld xmlns:a="http://schemas.openxmlformats.org/drawingml/2006/main" xmlns:r="http://schemas.openxmlformats.org/officeDocument/2006/relationships" xmlns:p="http://schemas.openxmlformats.org/presentationml/2006/main">
-  <p:cSld>
-    <p:spTree>
-      <p:nvGrpSpPr>
-        <p:cNvPr id="1" name=""/>
-        <p:cNvGrpSpPr/>
-        <p:nvPr/>
-      </p:nvGrpSpPr>
-      <p:grpSpPr>
-        <a:xfrm>
-          <a:off x="0" y="0"/>
-          <a:ext cx="0" cy="0"/>
-          <a:chOff x="0" y="0"/>
-          <a:chExt cx="0" cy="0"/>
-        </a:xfrm>
-      </p:grpSpPr>
-      <p:sp>
-        <p:nvSpPr>
-          <p:cNvPr id="2" name="Title 1"/>
-          <p:cNvSpPr>
-            <a:spLocks noGrp="1"/>
-          </p:cNvSpPr>
-          <p:nvPr>
-            <p:ph type="ctrTitle"/>
-          </p:nvPr>
-        </p:nvSpPr>
-        <p:spPr>
-          <a:xfrm>
-            <a:off x="606175" y="676048"/>
-            <a:ext cx="11034445" cy="2387600"/>
-          </a:xfrm>
-        </p:spPr>
-        <p:txBody>
-          <a:bodyPr/>
-          <a:lstStyle/>
-          <a:p>
-            <a:r>
-              <a:rPr lang="en-US" dirty="0" smtClean="0"/>
-              <a:t>Fast and Nimble</a:t>
-            </a:r>
-            <a:endParaRPr lang="en-US" dirty="0"/>
-          </a:p>
-        </p:txBody>
-      </p:sp>
-      <p:sp>
-        <p:nvSpPr>
-          <p:cNvPr id="3" name="Subtitle 2"/>
-          <p:cNvSpPr>
-            <a:spLocks noGrp="1"/>
-          </p:cNvSpPr>
-          <p:nvPr>
-            <p:ph type="subTitle" idx="1"/>
-          </p:nvPr>
-        </p:nvSpPr>
-        <p:spPr>
-          <a:xfrm>
-            <a:off x="606175" y="3210153"/>
-            <a:ext cx="11034445" cy="1655762"/>
-          </a:xfrm>
-        </p:spPr>
-        <p:txBody>
-          <a:bodyPr>
-            <a:noAutofit/>
-          </a:bodyPr>
-          <a:lstStyle/>
-          <a:p>
-            <a:pPr>
-              <a:lnSpc>
-                <a:spcPct val="110000"/>
-              </a:lnSpc>
-            </a:pPr>
-            <a:r>
-              <a:rPr lang="en-US" dirty="0" smtClean="0">
-                <a:sym typeface="Wingdings" panose="05000000000000000000" pitchFamily="2" charset="2"/>
-              </a:rPr>
-              <a:t> Smaller sites, and more of them</a:t>
-            </a:r>
-            <a:endParaRPr lang="en-US" dirty="0" smtClean="0"/>
-          </a:p>
-          <a:p>
-            <a:pPr>
-              <a:lnSpc>
-                <a:spcPct val="110000"/>
-              </a:lnSpc>
-            </a:pPr>
-            <a:r>
-              <a:rPr lang="en-US" dirty="0" smtClean="0">
-                <a:sym typeface="Wingdings" panose="05000000000000000000" pitchFamily="2" charset="2"/>
-              </a:rPr>
-              <a:t> Quick feature adoption for platform &amp; host</a:t>
-            </a:r>
-            <a:endParaRPr lang="en-US" dirty="0" smtClean="0"/>
-          </a:p>
-          <a:p>
-            <a:pPr>
-              <a:lnSpc>
-                <a:spcPct val="110000"/>
-              </a:lnSpc>
-            </a:pPr>
-            <a:r>
-              <a:rPr lang="en-US" dirty="0" smtClean="0">
-                <a:sym typeface="Wingdings" panose="05000000000000000000" pitchFamily="2" charset="2"/>
-              </a:rPr>
-              <a:t> Reduce overhead as much as possible</a:t>
-            </a:r>
-            <a:endParaRPr lang="en-US" dirty="0"/>
-          </a:p>
-        </p:txBody>
-      </p:sp>
-    </p:spTree>
-    <p:extLst>
-      <p:ext uri="{BB962C8B-B14F-4D97-AF65-F5344CB8AC3E}">
-        <p14:creationId xmlns:p14="http://schemas.microsoft.com/office/powerpoint/2010/main" val="1254983507"/>
-      </p:ext>
-    </p:extLst>
-  </p:cSld>
-  <p:clrMapOvr>
-    <a:masterClrMapping/>
-  </p:clrMapOvr>
-  <p:timing>
-    <p:tnLst>
-      <p:par>
-        <p:cTn id="1" dur="indefinite" restart="never" nodeType="tmRoot"/>
-      </p:par>
-    </p:tnLst>
-  </p:timing>
-</p:sld>
-</file>
-
 <file path=ppt/slides/slide12.xml><?xml version="1.0" encoding="utf-8"?>
 <p:sld xmlns:a="http://schemas.openxmlformats.org/drawingml/2006/main" xmlns:r="http://schemas.openxmlformats.org/officeDocument/2006/relationships" xmlns:p="http://schemas.openxmlformats.org/presentationml/2006/main">
   <p:cSld>
@@ -20863,7 +20892,7 @@
           <a:p>
             <a:r>
               <a:rPr lang="en-US" dirty="0" smtClean="0"/>
-              <a:t>aspConf 1 &amp; 2</a:t>
+              <a:t>Fast and Nimble</a:t>
             </a:r>
             <a:endParaRPr lang="en-US" dirty="0"/>
           </a:p>
@@ -20900,7 +20929,7 @@
               <a:rPr lang="en-US" dirty="0" smtClean="0">
                 <a:sym typeface="Wingdings" panose="05000000000000000000" pitchFamily="2" charset="2"/>
               </a:rPr>
-              <a:t> Go bigger but stay true to core values</a:t>
+              <a:t> Smaller sites, and more of them</a:t>
             </a:r>
             <a:endParaRPr lang="en-US" dirty="0" smtClean="0"/>
           </a:p>
@@ -20914,7 +20943,7 @@
               <a:rPr lang="en-US" dirty="0" smtClean="0">
                 <a:sym typeface="Wingdings" panose="05000000000000000000" pitchFamily="2" charset="2"/>
               </a:rPr>
-              <a:t> Outsource problems</a:t>
+              <a:t> Quick feature adoption for platform &amp; host</a:t>
             </a:r>
             <a:endParaRPr lang="en-US" dirty="0" smtClean="0"/>
           </a:p>
@@ -20928,36 +20957,142 @@
               <a:rPr lang="en-US" dirty="0" smtClean="0">
                 <a:sym typeface="Wingdings" panose="05000000000000000000" pitchFamily="2" charset="2"/>
               </a:rPr>
-              <a:t> Don’t break the bank</a:t>
+              <a:t> Reduce overhead as much as possible</a:t>
             </a:r>
             <a:endParaRPr lang="en-US" dirty="0"/>
           </a:p>
         </p:txBody>
       </p:sp>
-      <p:pic>
-        <p:nvPicPr>
-          <p:cNvPr id="4" name="Picture 3"/>
-          <p:cNvPicPr>
-            <a:picLocks noChangeAspect="1"/>
-          </p:cNvPicPr>
-          <p:nvPr/>
-        </p:nvPicPr>
-        <p:blipFill>
-          <a:blip r:embed="rId2"/>
-          <a:stretch>
-            <a:fillRect/>
-          </a:stretch>
-        </p:blipFill>
+    </p:spTree>
+    <p:extLst>
+      <p:ext uri="{BB962C8B-B14F-4D97-AF65-F5344CB8AC3E}">
+        <p14:creationId xmlns:p14="http://schemas.microsoft.com/office/powerpoint/2010/main" val="1254983507"/>
+      </p:ext>
+    </p:extLst>
+  </p:cSld>
+  <p:clrMapOvr>
+    <a:masterClrMapping/>
+  </p:clrMapOvr>
+  <p:timing>
+    <p:tnLst>
+      <p:par>
+        <p:cTn id="1" dur="indefinite" restart="never" nodeType="tmRoot"/>
+      </p:par>
+    </p:tnLst>
+  </p:timing>
+</p:sld>
+</file>
+
+<file path=ppt/slides/slide13.xml><?xml version="1.0" encoding="utf-8"?>
+<p:sld xmlns:a="http://schemas.openxmlformats.org/drawingml/2006/main" xmlns:r="http://schemas.openxmlformats.org/officeDocument/2006/relationships" xmlns:p="http://schemas.openxmlformats.org/presentationml/2006/main">
+  <p:cSld>
+    <p:spTree>
+      <p:nvGrpSpPr>
+        <p:cNvPr id="1" name=""/>
+        <p:cNvGrpSpPr/>
+        <p:nvPr/>
+      </p:nvGrpSpPr>
+      <p:grpSpPr>
+        <a:xfrm>
+          <a:off x="0" y="0"/>
+          <a:ext cx="0" cy="0"/>
+          <a:chOff x="0" y="0"/>
+          <a:chExt cx="0" cy="0"/>
+        </a:xfrm>
+      </p:grpSpPr>
+      <p:sp>
+        <p:nvSpPr>
+          <p:cNvPr id="2" name="Title 1"/>
+          <p:cNvSpPr>
+            <a:spLocks noGrp="1"/>
+          </p:cNvSpPr>
+          <p:nvPr>
+            <p:ph type="ctrTitle"/>
+          </p:nvPr>
+        </p:nvSpPr>
         <p:spPr>
           <a:xfrm>
-            <a:off x="7595435" y="2117953"/>
-            <a:ext cx="4045185" cy="1092200"/>
+            <a:off x="606175" y="676048"/>
+            <a:ext cx="11034445" cy="2387600"/>
           </a:xfrm>
-          <a:prstGeom prst="rect">
-            <a:avLst/>
-          </a:prstGeom>
         </p:spPr>
-      </p:pic>
+        <p:txBody>
+          <a:bodyPr/>
+          <a:lstStyle/>
+          <a:p>
+            <a:r>
+              <a:rPr lang="en-US" dirty="0" smtClean="0"/>
+              <a:t>aspConf 1 &amp; 2</a:t>
+            </a:r>
+            <a:endParaRPr lang="en-US" dirty="0"/>
+          </a:p>
+        </p:txBody>
+      </p:sp>
+      <p:sp>
+        <p:nvSpPr>
+          <p:cNvPr id="3" name="Subtitle 2"/>
+          <p:cNvSpPr>
+            <a:spLocks noGrp="1"/>
+          </p:cNvSpPr>
+          <p:nvPr>
+            <p:ph type="subTitle" idx="1"/>
+          </p:nvPr>
+        </p:nvSpPr>
+        <p:spPr>
+          <a:xfrm>
+            <a:off x="606175" y="3210153"/>
+            <a:ext cx="11034445" cy="1655762"/>
+          </a:xfrm>
+        </p:spPr>
+        <p:txBody>
+          <a:bodyPr>
+            <a:noAutofit/>
+          </a:bodyPr>
+          <a:lstStyle/>
+          <a:p>
+            <a:pPr>
+              <a:lnSpc>
+                <a:spcPct val="110000"/>
+              </a:lnSpc>
+            </a:pPr>
+            <a:r>
+              <a:rPr lang="en-US" dirty="0" smtClean="0">
+                <a:sym typeface="Wingdings" panose="05000000000000000000" pitchFamily="2" charset="2"/>
+              </a:rPr>
+              <a:t> Go bigger but stay true to core values</a:t>
+            </a:r>
+            <a:endParaRPr lang="en-US" dirty="0" smtClean="0"/>
+          </a:p>
+          <a:p>
+            <a:pPr>
+              <a:lnSpc>
+                <a:spcPct val="110000"/>
+              </a:lnSpc>
+            </a:pPr>
+            <a:r>
+              <a:rPr lang="en-US" dirty="0" smtClean="0">
+                <a:sym typeface="Wingdings" panose="05000000000000000000" pitchFamily="2" charset="2"/>
+              </a:rPr>
+              <a:t> Outsource problems</a:t>
+            </a:r>
+            <a:endParaRPr lang="en-US" dirty="0" smtClean="0"/>
+          </a:p>
+          <a:p>
+            <a:pPr>
+              <a:lnSpc>
+                <a:spcPct val="110000"/>
+              </a:lnSpc>
+            </a:pPr>
+            <a:r>
+              <a:rPr lang="en-US" dirty="0" smtClean="0">
+                <a:sym typeface="Wingdings" panose="05000000000000000000" pitchFamily="2" charset="2"/>
+              </a:rPr>
+              <a:t> Don’t break the bank</a:t>
+            </a:r>
+            <a:endParaRPr lang="en-US" dirty="0"/>
+          </a:p>
+        </p:txBody>
+      </p:sp>
     </p:spTree>
     <p:extLst>
       <p:ext uri="{BB962C8B-B14F-4D97-AF65-F5344CB8AC3E}">
@@ -20978,7 +21113,7 @@
 </p:sld>
 </file>
 
-<file path=ppt/slides/slide13.xml><?xml version="1.0" encoding="utf-8"?>
+<file path=ppt/slides/slide14.xml><?xml version="1.0" encoding="utf-8"?>
 <p:sld xmlns:a="http://schemas.openxmlformats.org/drawingml/2006/main" xmlns:r="http://schemas.openxmlformats.org/officeDocument/2006/relationships" xmlns:p="http://schemas.openxmlformats.org/presentationml/2006/main">
   <p:cSld>
     <p:spTree>
@@ -22463,7 +22598,7 @@
 </p:sld>
 </file>
 
-<file path=ppt/slides/slide14.xml><?xml version="1.0" encoding="utf-8"?>
+<file path=ppt/slides/slide15.xml><?xml version="1.0" encoding="utf-8"?>
 <p:sld xmlns:a="http://schemas.openxmlformats.org/drawingml/2006/main" xmlns:r="http://schemas.openxmlformats.org/officeDocument/2006/relationships" xmlns:p="http://schemas.openxmlformats.org/presentationml/2006/main">
   <p:cSld>
     <p:spTree>
@@ -22573,36 +22708,6 @@
           </a:p>
         </p:txBody>
       </p:sp>
-      <p:pic>
-        <p:nvPicPr>
-          <p:cNvPr id="4" name="Picture 3"/>
-          <p:cNvPicPr>
-            <a:picLocks noChangeAspect="1"/>
-          </p:cNvPicPr>
-          <p:nvPr/>
-        </p:nvPicPr>
-        <p:blipFill>
-          <a:blip r:embed="rId2" cstate="print">
-            <a:extLst>
-              <a:ext uri="{28A0092B-C50C-407E-A947-70E740481C1C}">
-                <a14:useLocalDpi xmlns:a14="http://schemas.microsoft.com/office/drawing/2010/main" val="0"/>
-              </a:ext>
-            </a:extLst>
-          </a:blip>
-          <a:stretch>
-            <a:fillRect/>
-          </a:stretch>
-        </p:blipFill>
-        <p:spPr>
-          <a:xfrm>
-            <a:off x="7595435" y="2119618"/>
-            <a:ext cx="4045185" cy="1090535"/>
-          </a:xfrm>
-          <a:prstGeom prst="rect">
-            <a:avLst/>
-          </a:prstGeom>
-        </p:spPr>
-      </p:pic>
     </p:spTree>
     <p:extLst>
       <p:ext uri="{BB962C8B-B14F-4D97-AF65-F5344CB8AC3E}">
@@ -22623,7 +22728,7 @@
 </p:sld>
 </file>
 
-<file path=ppt/slides/slide15.xml><?xml version="1.0" encoding="utf-8"?>
+<file path=ppt/slides/slide16.xml><?xml version="1.0" encoding="utf-8"?>
 <p:sld xmlns:a="http://schemas.openxmlformats.org/drawingml/2006/main" xmlns:r="http://schemas.openxmlformats.org/officeDocument/2006/relationships" xmlns:p="http://schemas.openxmlformats.org/presentationml/2006/main">
   <p:cSld>
     <p:spTree>
@@ -24108,7 +24213,7 @@
 </p:sld>
 </file>
 
-<file path=ppt/slides/slide16.xml><?xml version="1.0" encoding="utf-8"?>
+<file path=ppt/slides/slide17.xml><?xml version="1.0" encoding="utf-8"?>
 <p:sld xmlns:a="http://schemas.openxmlformats.org/drawingml/2006/main" xmlns:r="http://schemas.openxmlformats.org/officeDocument/2006/relationships" xmlns:p="http://schemas.openxmlformats.org/presentationml/2006/main">
   <p:cSld>
     <p:spTree>
@@ -24183,140 +24288,6 @@
     <p:extLst>
       <p:ext uri="{BB962C8B-B14F-4D97-AF65-F5344CB8AC3E}">
         <p14:creationId xmlns:p14="http://schemas.microsoft.com/office/powerpoint/2010/main" val="2502701738"/>
-      </p:ext>
-    </p:extLst>
-  </p:cSld>
-  <p:clrMapOvr>
-    <a:masterClrMapping/>
-  </p:clrMapOvr>
-  <p:timing>
-    <p:tnLst>
-      <p:par>
-        <p:cTn id="1" dur="indefinite" restart="never" nodeType="tmRoot"/>
-      </p:par>
-    </p:tnLst>
-  </p:timing>
-</p:sld>
-</file>
-
-<file path=ppt/slides/slide17.xml><?xml version="1.0" encoding="utf-8"?>
-<p:sld xmlns:a="http://schemas.openxmlformats.org/drawingml/2006/main" xmlns:r="http://schemas.openxmlformats.org/officeDocument/2006/relationships" xmlns:p="http://schemas.openxmlformats.org/presentationml/2006/main">
-  <p:cSld>
-    <p:spTree>
-      <p:nvGrpSpPr>
-        <p:cNvPr id="1" name=""/>
-        <p:cNvGrpSpPr/>
-        <p:nvPr/>
-      </p:nvGrpSpPr>
-      <p:grpSpPr>
-        <a:xfrm>
-          <a:off x="0" y="0"/>
-          <a:ext cx="0" cy="0"/>
-          <a:chOff x="0" y="0"/>
-          <a:chExt cx="0" cy="0"/>
-        </a:xfrm>
-      </p:grpSpPr>
-      <p:sp>
-        <p:nvSpPr>
-          <p:cNvPr id="2" name="Title 1"/>
-          <p:cNvSpPr>
-            <a:spLocks noGrp="1"/>
-          </p:cNvSpPr>
-          <p:nvPr>
-            <p:ph type="ctrTitle"/>
-          </p:nvPr>
-        </p:nvSpPr>
-        <p:spPr>
-          <a:xfrm>
-            <a:off x="606175" y="676048"/>
-            <a:ext cx="11034445" cy="2387600"/>
-          </a:xfrm>
-        </p:spPr>
-        <p:txBody>
-          <a:bodyPr/>
-          <a:lstStyle/>
-          <a:p>
-            <a:r>
-              <a:rPr lang="en-US" dirty="0" err="1" smtClean="0"/>
-              <a:t>yourConf</a:t>
-            </a:r>
-            <a:r>
-              <a:rPr lang="en-US" dirty="0" smtClean="0"/>
-              <a:t> 2014</a:t>
-            </a:r>
-            <a:endParaRPr lang="en-US" dirty="0"/>
-          </a:p>
-        </p:txBody>
-      </p:sp>
-      <p:sp>
-        <p:nvSpPr>
-          <p:cNvPr id="3" name="Subtitle 2"/>
-          <p:cNvSpPr>
-            <a:spLocks noGrp="1"/>
-          </p:cNvSpPr>
-          <p:nvPr>
-            <p:ph type="subTitle" idx="1"/>
-          </p:nvPr>
-        </p:nvSpPr>
-        <p:spPr>
-          <a:xfrm>
-            <a:off x="606175" y="3210153"/>
-            <a:ext cx="11034445" cy="1655762"/>
-          </a:xfrm>
-        </p:spPr>
-        <p:txBody>
-          <a:bodyPr>
-            <a:noAutofit/>
-          </a:bodyPr>
-          <a:lstStyle/>
-          <a:p>
-            <a:pPr>
-              <a:lnSpc>
-                <a:spcPct val="110000"/>
-              </a:lnSpc>
-            </a:pPr>
-            <a:r>
-              <a:rPr lang="en-US" dirty="0" smtClean="0">
-                <a:sym typeface="Wingdings" panose="05000000000000000000" pitchFamily="2" charset="2"/>
-              </a:rPr>
-              <a:t> Run micro site on all US regions</a:t>
-            </a:r>
-            <a:endParaRPr lang="en-US" dirty="0" smtClean="0"/>
-          </a:p>
-          <a:p>
-            <a:pPr>
-              <a:lnSpc>
-                <a:spcPct val="110000"/>
-              </a:lnSpc>
-            </a:pPr>
-            <a:r>
-              <a:rPr lang="en-US" dirty="0" smtClean="0">
-                <a:sym typeface="Wingdings" panose="05000000000000000000" pitchFamily="2" charset="2"/>
-              </a:rPr>
-              <a:t> Direct traffic to closest data center (DC)</a:t>
-            </a:r>
-            <a:endParaRPr lang="en-US" dirty="0" smtClean="0"/>
-          </a:p>
-          <a:p>
-            <a:pPr>
-              <a:lnSpc>
-                <a:spcPct val="110000"/>
-              </a:lnSpc>
-            </a:pPr>
-            <a:r>
-              <a:rPr lang="en-US" dirty="0" smtClean="0">
-                <a:sym typeface="Wingdings" panose="05000000000000000000" pitchFamily="2" charset="2"/>
-              </a:rPr>
-              <a:t> Tell DC when application has failed</a:t>
-            </a:r>
-            <a:endParaRPr lang="en-US" dirty="0"/>
-          </a:p>
-        </p:txBody>
-      </p:sp>
-    </p:spTree>
-    <p:extLst>
-      <p:ext uri="{BB962C8B-B14F-4D97-AF65-F5344CB8AC3E}">
-        <p14:creationId xmlns:p14="http://schemas.microsoft.com/office/powerpoint/2010/main" val="3382247094"/>
       </p:ext>
     </p:extLst>
   </p:cSld>
@@ -24413,6 +24384,140 @@
               <a:rPr lang="en-US" dirty="0" smtClean="0">
                 <a:sym typeface="Wingdings" panose="05000000000000000000" pitchFamily="2" charset="2"/>
               </a:rPr>
+              <a:t> Run micro site on all US regions</a:t>
+            </a:r>
+            <a:endParaRPr lang="en-US" dirty="0" smtClean="0"/>
+          </a:p>
+          <a:p>
+            <a:pPr>
+              <a:lnSpc>
+                <a:spcPct val="110000"/>
+              </a:lnSpc>
+            </a:pPr>
+            <a:r>
+              <a:rPr lang="en-US" dirty="0" smtClean="0">
+                <a:sym typeface="Wingdings" panose="05000000000000000000" pitchFamily="2" charset="2"/>
+              </a:rPr>
+              <a:t> Direct traffic to closest data center (DC)</a:t>
+            </a:r>
+            <a:endParaRPr lang="en-US" dirty="0" smtClean="0"/>
+          </a:p>
+          <a:p>
+            <a:pPr>
+              <a:lnSpc>
+                <a:spcPct val="110000"/>
+              </a:lnSpc>
+            </a:pPr>
+            <a:r>
+              <a:rPr lang="en-US" dirty="0" smtClean="0">
+                <a:sym typeface="Wingdings" panose="05000000000000000000" pitchFamily="2" charset="2"/>
+              </a:rPr>
+              <a:t> Tell DC when application has failed</a:t>
+            </a:r>
+            <a:endParaRPr lang="en-US" dirty="0"/>
+          </a:p>
+        </p:txBody>
+      </p:sp>
+    </p:spTree>
+    <p:extLst>
+      <p:ext uri="{BB962C8B-B14F-4D97-AF65-F5344CB8AC3E}">
+        <p14:creationId xmlns:p14="http://schemas.microsoft.com/office/powerpoint/2010/main" val="3382247094"/>
+      </p:ext>
+    </p:extLst>
+  </p:cSld>
+  <p:clrMapOvr>
+    <a:masterClrMapping/>
+  </p:clrMapOvr>
+  <p:timing>
+    <p:tnLst>
+      <p:par>
+        <p:cTn id="1" dur="indefinite" restart="never" nodeType="tmRoot"/>
+      </p:par>
+    </p:tnLst>
+  </p:timing>
+</p:sld>
+</file>
+
+<file path=ppt/slides/slide19.xml><?xml version="1.0" encoding="utf-8"?>
+<p:sld xmlns:a="http://schemas.openxmlformats.org/drawingml/2006/main" xmlns:r="http://schemas.openxmlformats.org/officeDocument/2006/relationships" xmlns:p="http://schemas.openxmlformats.org/presentationml/2006/main">
+  <p:cSld>
+    <p:spTree>
+      <p:nvGrpSpPr>
+        <p:cNvPr id="1" name=""/>
+        <p:cNvGrpSpPr/>
+        <p:nvPr/>
+      </p:nvGrpSpPr>
+      <p:grpSpPr>
+        <a:xfrm>
+          <a:off x="0" y="0"/>
+          <a:ext cx="0" cy="0"/>
+          <a:chOff x="0" y="0"/>
+          <a:chExt cx="0" cy="0"/>
+        </a:xfrm>
+      </p:grpSpPr>
+      <p:sp>
+        <p:nvSpPr>
+          <p:cNvPr id="2" name="Title 1"/>
+          <p:cNvSpPr>
+            <a:spLocks noGrp="1"/>
+          </p:cNvSpPr>
+          <p:nvPr>
+            <p:ph type="ctrTitle"/>
+          </p:nvPr>
+        </p:nvSpPr>
+        <p:spPr>
+          <a:xfrm>
+            <a:off x="606175" y="676048"/>
+            <a:ext cx="11034445" cy="2387600"/>
+          </a:xfrm>
+        </p:spPr>
+        <p:txBody>
+          <a:bodyPr/>
+          <a:lstStyle/>
+          <a:p>
+            <a:r>
+              <a:rPr lang="en-US" dirty="0" err="1" smtClean="0"/>
+              <a:t>yourConf</a:t>
+            </a:r>
+            <a:r>
+              <a:rPr lang="en-US" dirty="0" smtClean="0"/>
+              <a:t> 2014</a:t>
+            </a:r>
+            <a:endParaRPr lang="en-US" dirty="0"/>
+          </a:p>
+        </p:txBody>
+      </p:sp>
+      <p:sp>
+        <p:nvSpPr>
+          <p:cNvPr id="3" name="Subtitle 2"/>
+          <p:cNvSpPr>
+            <a:spLocks noGrp="1"/>
+          </p:cNvSpPr>
+          <p:nvPr>
+            <p:ph type="subTitle" idx="1"/>
+          </p:nvPr>
+        </p:nvSpPr>
+        <p:spPr>
+          <a:xfrm>
+            <a:off x="606175" y="3210153"/>
+            <a:ext cx="11034445" cy="1655762"/>
+          </a:xfrm>
+        </p:spPr>
+        <p:txBody>
+          <a:bodyPr>
+            <a:noAutofit/>
+          </a:bodyPr>
+          <a:lstStyle/>
+          <a:p>
+            <a:pPr>
+              <a:lnSpc>
+                <a:spcPct val="110000"/>
+              </a:lnSpc>
+            </a:pPr>
+            <a:r>
+              <a:rPr lang="en-US" dirty="0" smtClean="0">
+                <a:sym typeface="Wingdings" panose="05000000000000000000" pitchFamily="2" charset="2"/>
+              </a:rPr>
               <a:t> Application autonomy</a:t>
             </a:r>
             <a:endParaRPr lang="en-US" dirty="0" smtClean="0"/>
@@ -24473,7 +24578,156 @@
 </p:sld>
 </file>
 
-<file path=ppt/slides/slide19.xml><?xml version="1.0" encoding="utf-8"?>
+<file path=ppt/slides/slide2.xml><?xml version="1.0" encoding="utf-8"?>
+<p:sld xmlns:a="http://schemas.openxmlformats.org/drawingml/2006/main" xmlns:r="http://schemas.openxmlformats.org/officeDocument/2006/relationships" xmlns:p="http://schemas.openxmlformats.org/presentationml/2006/main">
+  <p:cSld>
+    <p:spTree>
+      <p:nvGrpSpPr>
+        <p:cNvPr id="1" name=""/>
+        <p:cNvGrpSpPr/>
+        <p:nvPr/>
+      </p:nvGrpSpPr>
+      <p:grpSpPr>
+        <a:xfrm>
+          <a:off x="0" y="0"/>
+          <a:ext cx="0" cy="0"/>
+          <a:chOff x="0" y="0"/>
+          <a:chExt cx="0" cy="0"/>
+        </a:xfrm>
+      </p:grpSpPr>
+      <p:sp>
+        <p:nvSpPr>
+          <p:cNvPr id="4" name="Title 3"/>
+          <p:cNvSpPr>
+            <a:spLocks noGrp="1"/>
+          </p:cNvSpPr>
+          <p:nvPr>
+            <p:ph type="title"/>
+          </p:nvPr>
+        </p:nvSpPr>
+        <p:spPr/>
+        <p:txBody>
+          <a:bodyPr/>
+          <a:lstStyle/>
+          <a:p>
+            <a:r>
+              <a:rPr lang="en-US" dirty="0" smtClean="0"/>
+              <a:t>Agenda</a:t>
+            </a:r>
+            <a:endParaRPr lang="en-US" dirty="0"/>
+          </a:p>
+        </p:txBody>
+      </p:sp>
+      <p:sp>
+        <p:nvSpPr>
+          <p:cNvPr id="5" name="Content Placeholder 4"/>
+          <p:cNvSpPr>
+            <a:spLocks noGrp="1"/>
+          </p:cNvSpPr>
+          <p:nvPr>
+            <p:ph idx="1"/>
+          </p:nvPr>
+        </p:nvSpPr>
+        <p:spPr/>
+        <p:txBody>
+          <a:bodyPr>
+            <a:normAutofit/>
+          </a:bodyPr>
+          <a:lstStyle/>
+          <a:p>
+            <a:pPr marL="742950" indent="-742950">
+              <a:lnSpc>
+                <a:spcPct val="100000"/>
+              </a:lnSpc>
+              <a:buAutoNum type="arabicParenR"/>
+            </a:pPr>
+            <a:r>
+              <a:rPr lang="en-US" sz="5400" dirty="0" smtClean="0">
+                <a:latin typeface="+mj-lt"/>
+              </a:rPr>
+              <a:t>How did we get here?</a:t>
+            </a:r>
+          </a:p>
+          <a:p>
+            <a:pPr marL="742950" indent="-742950">
+              <a:lnSpc>
+                <a:spcPct val="100000"/>
+              </a:lnSpc>
+              <a:buAutoNum type="arabicParenR"/>
+            </a:pPr>
+            <a:r>
+              <a:rPr lang="en-US" sz="5400" dirty="0" smtClean="0">
+                <a:latin typeface="+mj-lt"/>
+              </a:rPr>
+              <a:t>Building </a:t>
+            </a:r>
+            <a:r>
+              <a:rPr lang="en-US" sz="5400" dirty="0" err="1" smtClean="0">
+                <a:latin typeface="+mj-lt"/>
+              </a:rPr>
+              <a:t>yourConf</a:t>
+            </a:r>
+            <a:r>
+              <a:rPr lang="en-US" sz="5400" dirty="0" smtClean="0">
+                <a:latin typeface="+mj-lt"/>
+              </a:rPr>
+              <a:t> </a:t>
+            </a:r>
+          </a:p>
+          <a:p>
+            <a:pPr marL="742950" indent="-742950">
+              <a:lnSpc>
+                <a:spcPct val="100000"/>
+              </a:lnSpc>
+              <a:buAutoNum type="arabicParenR"/>
+            </a:pPr>
+            <a:r>
+              <a:rPr lang="en-US" sz="5400" dirty="0" smtClean="0">
+                <a:latin typeface="+mj-lt"/>
+              </a:rPr>
+              <a:t>Demos</a:t>
+            </a:r>
+          </a:p>
+          <a:p>
+            <a:pPr marL="742950" indent="-742950">
+              <a:lnSpc>
+                <a:spcPct val="100000"/>
+              </a:lnSpc>
+              <a:buAutoNum type="arabicParenR"/>
+            </a:pPr>
+            <a:r>
+              <a:rPr lang="en-US" sz="5400" dirty="0" smtClean="0">
+                <a:latin typeface="+mj-lt"/>
+              </a:rPr>
+              <a:t>In closing</a:t>
+            </a:r>
+            <a:endParaRPr lang="en-US" sz="5400" dirty="0">
+              <a:latin typeface="+mj-lt"/>
+            </a:endParaRPr>
+          </a:p>
+        </p:txBody>
+      </p:sp>
+    </p:spTree>
+    <p:extLst>
+      <p:ext uri="{BB962C8B-B14F-4D97-AF65-F5344CB8AC3E}">
+        <p14:creationId xmlns:p14="http://schemas.microsoft.com/office/powerpoint/2010/main" val="3063510516"/>
+      </p:ext>
+    </p:extLst>
+  </p:cSld>
+  <p:clrMapOvr>
+    <a:masterClrMapping/>
+  </p:clrMapOvr>
+  <p:timing>
+    <p:tnLst>
+      <p:par>
+        <p:cTn id="1" dur="indefinite" restart="never" nodeType="tmRoot"/>
+      </p:par>
+    </p:tnLst>
+  </p:timing>
+</p:sld>
+</file>
+
+<file path=ppt/slides/slide20.xml><?xml version="1.0" encoding="utf-8"?>
 <p:sld xmlns:a="http://schemas.openxmlformats.org/drawingml/2006/main" xmlns:r="http://schemas.openxmlformats.org/officeDocument/2006/relationships" xmlns:p="http://schemas.openxmlformats.org/presentationml/2006/main">
   <p:cSld>
     <p:spTree>
@@ -24731,156 +24985,7 @@
 </p:sld>
 </file>
 
-<file path=ppt/slides/slide2.xml><?xml version="1.0" encoding="utf-8"?>
-<p:sld xmlns:a="http://schemas.openxmlformats.org/drawingml/2006/main" xmlns:r="http://schemas.openxmlformats.org/officeDocument/2006/relationships" xmlns:p="http://schemas.openxmlformats.org/presentationml/2006/main">
-  <p:cSld>
-    <p:spTree>
-      <p:nvGrpSpPr>
-        <p:cNvPr id="1" name=""/>
-        <p:cNvGrpSpPr/>
-        <p:nvPr/>
-      </p:nvGrpSpPr>
-      <p:grpSpPr>
-        <a:xfrm>
-          <a:off x="0" y="0"/>
-          <a:ext cx="0" cy="0"/>
-          <a:chOff x="0" y="0"/>
-          <a:chExt cx="0" cy="0"/>
-        </a:xfrm>
-      </p:grpSpPr>
-      <p:sp>
-        <p:nvSpPr>
-          <p:cNvPr id="4" name="Title 3"/>
-          <p:cNvSpPr>
-            <a:spLocks noGrp="1"/>
-          </p:cNvSpPr>
-          <p:nvPr>
-            <p:ph type="title"/>
-          </p:nvPr>
-        </p:nvSpPr>
-        <p:spPr/>
-        <p:txBody>
-          <a:bodyPr/>
-          <a:lstStyle/>
-          <a:p>
-            <a:r>
-              <a:rPr lang="en-US" dirty="0" smtClean="0"/>
-              <a:t>Agenda</a:t>
-            </a:r>
-            <a:endParaRPr lang="en-US" dirty="0"/>
-          </a:p>
-        </p:txBody>
-      </p:sp>
-      <p:sp>
-        <p:nvSpPr>
-          <p:cNvPr id="5" name="Content Placeholder 4"/>
-          <p:cNvSpPr>
-            <a:spLocks noGrp="1"/>
-          </p:cNvSpPr>
-          <p:nvPr>
-            <p:ph idx="1"/>
-          </p:nvPr>
-        </p:nvSpPr>
-        <p:spPr/>
-        <p:txBody>
-          <a:bodyPr>
-            <a:normAutofit/>
-          </a:bodyPr>
-          <a:lstStyle/>
-          <a:p>
-            <a:pPr marL="742950" indent="-742950">
-              <a:lnSpc>
-                <a:spcPct val="100000"/>
-              </a:lnSpc>
-              <a:buAutoNum type="arabicParenR"/>
-            </a:pPr>
-            <a:r>
-              <a:rPr lang="en-US" sz="5400" dirty="0" smtClean="0">
-                <a:latin typeface="+mj-lt"/>
-              </a:rPr>
-              <a:t>How did we get here?</a:t>
-            </a:r>
-          </a:p>
-          <a:p>
-            <a:pPr marL="742950" indent="-742950">
-              <a:lnSpc>
-                <a:spcPct val="100000"/>
-              </a:lnSpc>
-              <a:buAutoNum type="arabicParenR"/>
-            </a:pPr>
-            <a:r>
-              <a:rPr lang="en-US" sz="5400" dirty="0" smtClean="0">
-                <a:latin typeface="+mj-lt"/>
-              </a:rPr>
-              <a:t>Building </a:t>
-            </a:r>
-            <a:r>
-              <a:rPr lang="en-US" sz="5400" dirty="0" err="1" smtClean="0">
-                <a:latin typeface="+mj-lt"/>
-              </a:rPr>
-              <a:t>yourConf</a:t>
-            </a:r>
-            <a:r>
-              <a:rPr lang="en-US" sz="5400" dirty="0" smtClean="0">
-                <a:latin typeface="+mj-lt"/>
-              </a:rPr>
-              <a:t> </a:t>
-            </a:r>
-          </a:p>
-          <a:p>
-            <a:pPr marL="742950" indent="-742950">
-              <a:lnSpc>
-                <a:spcPct val="100000"/>
-              </a:lnSpc>
-              <a:buAutoNum type="arabicParenR"/>
-            </a:pPr>
-            <a:r>
-              <a:rPr lang="en-US" sz="5400" dirty="0" smtClean="0">
-                <a:latin typeface="+mj-lt"/>
-              </a:rPr>
-              <a:t>Demos</a:t>
-            </a:r>
-          </a:p>
-          <a:p>
-            <a:pPr marL="742950" indent="-742950">
-              <a:lnSpc>
-                <a:spcPct val="100000"/>
-              </a:lnSpc>
-              <a:buAutoNum type="arabicParenR"/>
-            </a:pPr>
-            <a:r>
-              <a:rPr lang="en-US" sz="5400" dirty="0" smtClean="0">
-                <a:latin typeface="+mj-lt"/>
-              </a:rPr>
-              <a:t>In closing</a:t>
-            </a:r>
-            <a:endParaRPr lang="en-US" sz="5400" dirty="0">
-              <a:latin typeface="+mj-lt"/>
-            </a:endParaRPr>
-          </a:p>
-        </p:txBody>
-      </p:sp>
-    </p:spTree>
-    <p:extLst>
-      <p:ext uri="{BB962C8B-B14F-4D97-AF65-F5344CB8AC3E}">
-        <p14:creationId xmlns:p14="http://schemas.microsoft.com/office/powerpoint/2010/main" val="3063510516"/>
-      </p:ext>
-    </p:extLst>
-  </p:cSld>
-  <p:clrMapOvr>
-    <a:masterClrMapping/>
-  </p:clrMapOvr>
-  <p:timing>
-    <p:tnLst>
-      <p:par>
-        <p:cTn id="1" dur="indefinite" restart="never" nodeType="tmRoot"/>
-      </p:par>
-    </p:tnLst>
-  </p:timing>
-</p:sld>
-</file>
-
-<file path=ppt/slides/slide20.xml><?xml version="1.0" encoding="utf-8"?>
+<file path=ppt/slides/slide21.xml><?xml version="1.0" encoding="utf-8"?>
 <p:sld xmlns:a="http://schemas.openxmlformats.org/drawingml/2006/main" xmlns:r="http://schemas.openxmlformats.org/officeDocument/2006/relationships" xmlns:p="http://schemas.openxmlformats.org/presentationml/2006/main">
   <p:cSld>
     <p:spTree>
@@ -25042,89 +25147,6 @@
       <p:transition spd="slow"/>
     </mc:Fallback>
   </mc:AlternateContent>
-  <p:timing>
-    <p:tnLst>
-      <p:par>
-        <p:cTn id="1" dur="indefinite" restart="never" nodeType="tmRoot"/>
-      </p:par>
-    </p:tnLst>
-  </p:timing>
-</p:sld>
-</file>
-
-<file path=ppt/slides/slide21.xml><?xml version="1.0" encoding="utf-8"?>
-<p:sld xmlns:a="http://schemas.openxmlformats.org/drawingml/2006/main" xmlns:r="http://schemas.openxmlformats.org/officeDocument/2006/relationships" xmlns:p="http://schemas.openxmlformats.org/presentationml/2006/main">
-  <p:cSld>
-    <p:spTree>
-      <p:nvGrpSpPr>
-        <p:cNvPr id="1" name=""/>
-        <p:cNvGrpSpPr/>
-        <p:nvPr/>
-      </p:nvGrpSpPr>
-      <p:grpSpPr>
-        <a:xfrm>
-          <a:off x="0" y="0"/>
-          <a:ext cx="0" cy="0"/>
-          <a:chOff x="0" y="0"/>
-          <a:chExt cx="0" cy="0"/>
-        </a:xfrm>
-      </p:grpSpPr>
-      <p:sp>
-        <p:nvSpPr>
-          <p:cNvPr id="2" name="Title 1"/>
-          <p:cNvSpPr>
-            <a:spLocks noGrp="1"/>
-          </p:cNvSpPr>
-          <p:nvPr>
-            <p:ph type="ctrTitle"/>
-          </p:nvPr>
-        </p:nvSpPr>
-        <p:spPr/>
-        <p:txBody>
-          <a:bodyPr/>
-          <a:lstStyle/>
-          <a:p>
-            <a:r>
-              <a:rPr lang="en-US" dirty="0" smtClean="0"/>
-              <a:t>Demos </a:t>
-            </a:r>
-            <a:endParaRPr lang="en-US" dirty="0"/>
-          </a:p>
-        </p:txBody>
-      </p:sp>
-      <p:sp>
-        <p:nvSpPr>
-          <p:cNvPr id="3" name="Subtitle 2"/>
-          <p:cNvSpPr>
-            <a:spLocks noGrp="1"/>
-          </p:cNvSpPr>
-          <p:nvPr>
-            <p:ph type="subTitle" idx="1"/>
-          </p:nvPr>
-        </p:nvSpPr>
-        <p:spPr/>
-        <p:txBody>
-          <a:bodyPr/>
-          <a:lstStyle/>
-          <a:p>
-            <a:r>
-              <a:rPr lang="en-US" dirty="0" smtClean="0"/>
-              <a:t>Bringing all the pieces together…</a:t>
-            </a:r>
-            <a:endParaRPr lang="en-US" dirty="0"/>
-          </a:p>
-        </p:txBody>
-      </p:sp>
-    </p:spTree>
-    <p:extLst>
-      <p:ext uri="{BB962C8B-B14F-4D97-AF65-F5344CB8AC3E}">
-        <p14:creationId xmlns:p14="http://schemas.microsoft.com/office/powerpoint/2010/main" val="1104933085"/>
-      </p:ext>
-    </p:extLst>
-  </p:cSld>
-  <p:clrMapOvr>
-    <a:masterClrMapping/>
-  </p:clrMapOvr>
   <p:timing>
     <p:tnLst>
       <p:par>
@@ -25169,7 +25191,7 @@
           <a:p>
             <a:r>
               <a:rPr lang="en-US" dirty="0" smtClean="0"/>
-              <a:t>In closing </a:t>
+              <a:t>Demos </a:t>
             </a:r>
             <a:endParaRPr lang="en-US" dirty="0"/>
           </a:p>
@@ -25192,7 +25214,7 @@
           <a:p>
             <a:r>
               <a:rPr lang="en-US" dirty="0" smtClean="0"/>
-              <a:t>Hope this was useful information…</a:t>
+              <a:t>Bringing all the pieces together…</a:t>
             </a:r>
             <a:endParaRPr lang="en-US" dirty="0"/>
           </a:p>
@@ -25201,7 +25223,7 @@
     </p:spTree>
     <p:extLst>
       <p:ext uri="{BB962C8B-B14F-4D97-AF65-F5344CB8AC3E}">
-        <p14:creationId xmlns:p14="http://schemas.microsoft.com/office/powerpoint/2010/main" val="3703441471"/>
+        <p14:creationId xmlns:p14="http://schemas.microsoft.com/office/powerpoint/2010/main" val="1104933085"/>
       </p:ext>
     </p:extLst>
   </p:cSld>
@@ -25237,6 +25259,89 @@
       </p:grpSpPr>
       <p:sp>
         <p:nvSpPr>
+          <p:cNvPr id="2" name="Title 1"/>
+          <p:cNvSpPr>
+            <a:spLocks noGrp="1"/>
+          </p:cNvSpPr>
+          <p:nvPr>
+            <p:ph type="ctrTitle"/>
+          </p:nvPr>
+        </p:nvSpPr>
+        <p:spPr/>
+        <p:txBody>
+          <a:bodyPr/>
+          <a:lstStyle/>
+          <a:p>
+            <a:r>
+              <a:rPr lang="en-US" dirty="0" smtClean="0"/>
+              <a:t>In closing </a:t>
+            </a:r>
+            <a:endParaRPr lang="en-US" dirty="0"/>
+          </a:p>
+        </p:txBody>
+      </p:sp>
+      <p:sp>
+        <p:nvSpPr>
+          <p:cNvPr id="3" name="Subtitle 2"/>
+          <p:cNvSpPr>
+            <a:spLocks noGrp="1"/>
+          </p:cNvSpPr>
+          <p:nvPr>
+            <p:ph type="subTitle" idx="1"/>
+          </p:nvPr>
+        </p:nvSpPr>
+        <p:spPr/>
+        <p:txBody>
+          <a:bodyPr/>
+          <a:lstStyle/>
+          <a:p>
+            <a:r>
+              <a:rPr lang="en-US" dirty="0" smtClean="0"/>
+              <a:t>Hope this was useful information…</a:t>
+            </a:r>
+            <a:endParaRPr lang="en-US" dirty="0"/>
+          </a:p>
+        </p:txBody>
+      </p:sp>
+    </p:spTree>
+    <p:extLst>
+      <p:ext uri="{BB962C8B-B14F-4D97-AF65-F5344CB8AC3E}">
+        <p14:creationId xmlns:p14="http://schemas.microsoft.com/office/powerpoint/2010/main" val="3703441471"/>
+      </p:ext>
+    </p:extLst>
+  </p:cSld>
+  <p:clrMapOvr>
+    <a:masterClrMapping/>
+  </p:clrMapOvr>
+  <p:timing>
+    <p:tnLst>
+      <p:par>
+        <p:cTn id="1" dur="indefinite" restart="never" nodeType="tmRoot"/>
+      </p:par>
+    </p:tnLst>
+  </p:timing>
+</p:sld>
+</file>
+
+<file path=ppt/slides/slide24.xml><?xml version="1.0" encoding="utf-8"?>
+<p:sld xmlns:a="http://schemas.openxmlformats.org/drawingml/2006/main" xmlns:r="http://schemas.openxmlformats.org/officeDocument/2006/relationships" xmlns:p="http://schemas.openxmlformats.org/presentationml/2006/main">
+  <p:cSld>
+    <p:spTree>
+      <p:nvGrpSpPr>
+        <p:cNvPr id="1" name=""/>
+        <p:cNvGrpSpPr/>
+        <p:nvPr/>
+      </p:nvGrpSpPr>
+      <p:grpSpPr>
+        <a:xfrm>
+          <a:off x="0" y="0"/>
+          <a:ext cx="0" cy="0"/>
+          <a:chOff x="0" y="0"/>
+          <a:chExt cx="0" cy="0"/>
+        </a:xfrm>
+      </p:grpSpPr>
+      <p:sp>
+        <p:nvSpPr>
           <p:cNvPr id="4" name="Title 3"/>
           <p:cNvSpPr>
             <a:spLocks noGrp="1"/>
@@ -25546,7 +25651,7 @@
 </p:sld>
 </file>
 
-<file path=ppt/slides/slide24.xml><?xml version="1.0" encoding="utf-8"?>
+<file path=ppt/slides/slide25.xml><?xml version="1.0" encoding="utf-8"?>
 <p:sld xmlns:a="http://schemas.openxmlformats.org/drawingml/2006/main" xmlns:r="http://schemas.openxmlformats.org/officeDocument/2006/relationships" xmlns:p="http://schemas.openxmlformats.org/presentationml/2006/main">
   <p:cSld>
     <p:bg>
@@ -26746,131 +26851,64 @@
           <a:chExt cx="0" cy="0"/>
         </a:xfrm>
       </p:grpSpPr>
-      <p:sp>
-        <p:nvSpPr>
-          <p:cNvPr id="2" name="Title 1"/>
-          <p:cNvSpPr>
-            <a:spLocks noGrp="1"/>
-          </p:cNvSpPr>
-          <p:nvPr>
-            <p:ph type="ctrTitle"/>
-          </p:nvPr>
-        </p:nvSpPr>
+      <p:pic>
+        <p:nvPicPr>
+          <p:cNvPr id="9" name="Picture 8"/>
+          <p:cNvPicPr>
+            <a:picLocks noChangeAspect="1"/>
+          </p:cNvPicPr>
+          <p:nvPr/>
+        </p:nvPicPr>
+        <p:blipFill>
+          <a:blip r:embed="rId2" cstate="print">
+            <a:extLst>
+              <a:ext uri="{28A0092B-C50C-407E-A947-70E740481C1C}">
+                <a14:useLocalDpi xmlns:a14="http://schemas.microsoft.com/office/drawing/2010/main" val="0"/>
+              </a:ext>
+            </a:extLst>
+          </a:blip>
+          <a:stretch>
+            <a:fillRect/>
+          </a:stretch>
+        </p:blipFill>
         <p:spPr>
           <a:xfrm>
-            <a:off x="606175" y="676048"/>
-            <a:ext cx="11034445" cy="2387600"/>
+            <a:off x="3834004" y="3368416"/>
+            <a:ext cx="4439139" cy="1196740"/>
           </a:xfrm>
+          <a:prstGeom prst="rect">
+            <a:avLst/>
+          </a:prstGeom>
         </p:spPr>
-        <p:txBody>
-          <a:bodyPr/>
-          <a:lstStyle/>
-          <a:p>
-            <a:r>
-              <a:rPr lang="en-US" dirty="0" err="1" smtClean="0"/>
-              <a:t>mvcConf</a:t>
-            </a:r>
-            <a:r>
-              <a:rPr lang="en-US" dirty="0" smtClean="0"/>
-              <a:t> 1 &amp; 2</a:t>
-            </a:r>
-            <a:endParaRPr lang="en-US" dirty="0"/>
-          </a:p>
-        </p:txBody>
-      </p:sp>
-      <p:sp>
-        <p:nvSpPr>
-          <p:cNvPr id="3" name="Subtitle 2"/>
-          <p:cNvSpPr>
-            <a:spLocks noGrp="1"/>
-          </p:cNvSpPr>
-          <p:nvPr>
-            <p:ph type="subTitle" idx="1"/>
-          </p:nvPr>
-        </p:nvSpPr>
+      </p:pic>
+      <p:pic>
+        <p:nvPicPr>
+          <p:cNvPr id="10" name="Picture 9"/>
+          <p:cNvPicPr>
+            <a:picLocks noChangeAspect="1"/>
+          </p:cNvPicPr>
+          <p:nvPr/>
+        </p:nvPicPr>
+        <p:blipFill>
+          <a:blip r:embed="rId3"/>
+          <a:stretch>
+            <a:fillRect/>
+          </a:stretch>
+        </p:blipFill>
         <p:spPr>
           <a:xfrm>
-            <a:off x="606175" y="3210153"/>
-            <a:ext cx="11034445" cy="1655762"/>
+            <a:off x="4073408" y="2117953"/>
+            <a:ext cx="4045185" cy="1092200"/>
           </a:xfrm>
+          <a:prstGeom prst="rect">
+            <a:avLst/>
+          </a:prstGeom>
         </p:spPr>
-        <p:txBody>
-          <a:bodyPr>
-            <a:noAutofit/>
-          </a:bodyPr>
-          <a:lstStyle/>
-          <a:p>
-            <a:pPr>
-              <a:lnSpc>
-                <a:spcPct val="110000"/>
-              </a:lnSpc>
-            </a:pPr>
-            <a:r>
-              <a:rPr lang="en-US" dirty="0" smtClean="0">
-                <a:sym typeface="Wingdings" panose="05000000000000000000" pitchFamily="2" charset="2"/>
-              </a:rPr>
-              <a:t> Single shared host</a:t>
-            </a:r>
-            <a:endParaRPr lang="en-US" dirty="0" smtClean="0"/>
-          </a:p>
-          <a:p>
-            <a:pPr>
-              <a:lnSpc>
-                <a:spcPct val="110000"/>
-              </a:lnSpc>
-            </a:pPr>
-            <a:r>
-              <a:rPr lang="en-US" dirty="0" smtClean="0">
-                <a:sym typeface="Wingdings" panose="05000000000000000000" pitchFamily="2" charset="2"/>
-              </a:rPr>
-              <a:t> Unforeseen capacity </a:t>
-            </a:r>
-            <a:r>
-              <a:rPr lang="en-US" dirty="0">
-                <a:sym typeface="Wingdings" panose="05000000000000000000" pitchFamily="2" charset="2"/>
-              </a:rPr>
-              <a:t>i</a:t>
-            </a:r>
-            <a:r>
-              <a:rPr lang="en-US" dirty="0" smtClean="0">
-                <a:sym typeface="Wingdings" panose="05000000000000000000" pitchFamily="2" charset="2"/>
-              </a:rPr>
-              <a:t>ssues (Good Problem)</a:t>
-            </a:r>
-            <a:endParaRPr lang="en-US" dirty="0" smtClean="0"/>
-          </a:p>
-          <a:p>
-            <a:pPr>
-              <a:lnSpc>
-                <a:spcPct val="110000"/>
-              </a:lnSpc>
-            </a:pPr>
-            <a:r>
-              <a:rPr lang="en-US" dirty="0" smtClean="0">
-                <a:sym typeface="Wingdings" panose="05000000000000000000" pitchFamily="2" charset="2"/>
-              </a:rPr>
-              <a:t> Better </a:t>
-            </a:r>
-            <a:r>
-              <a:rPr lang="en-US" dirty="0">
-                <a:sym typeface="Wingdings" panose="05000000000000000000" pitchFamily="2" charset="2"/>
-              </a:rPr>
-              <a:t>d</a:t>
-            </a:r>
-            <a:r>
-              <a:rPr lang="en-US" dirty="0" smtClean="0">
-                <a:sym typeface="Wingdings" panose="05000000000000000000" pitchFamily="2" charset="2"/>
-              </a:rPr>
-              <a:t>eployment story</a:t>
-            </a:r>
-            <a:endParaRPr lang="en-US" dirty="0"/>
-          </a:p>
-        </p:txBody>
-      </p:sp>
+      </p:pic>
     </p:spTree>
     <p:extLst>
       <p:ext uri="{BB962C8B-B14F-4D97-AF65-F5344CB8AC3E}">
-        <p14:creationId xmlns:p14="http://schemas.microsoft.com/office/powerpoint/2010/main" val="3144684332"/>
+        <p14:creationId xmlns:p14="http://schemas.microsoft.com/office/powerpoint/2010/main" val="3994550262"/>
       </p:ext>
     </p:extLst>
   </p:cSld>

</xml_diff>